<commit_message>
Added Dall-e dataset and simulations
</commit_message>
<xml_diff>
--- a/doc/figures/Figures.pptx
+++ b/doc/figures/Figures.pptx
@@ -6,6 +6,7 @@
   </p:sldMasterIdLst>
   <p:sldIdLst>
     <p:sldId id="256" r:id="rId2"/>
+    <p:sldId id="257" r:id="rId3"/>
   </p:sldIdLst>
   <p:sldSz cx="12192000" cy="6858000"/>
   <p:notesSz cx="6858000" cy="9144000"/>
@@ -104,6 +105,11 @@
       </a:defRPr>
     </a:lvl9pPr>
   </p:defaultTextStyle>
+  <p:extLst>
+    <p:ext uri="{EFAFB233-063F-42B5-8137-9DF3F51BA10A}">
+      <p15:sldGuideLst xmlns:p15="http://schemas.microsoft.com/office/powerpoint/2012/main"/>
+    </p:ext>
+  </p:extLst>
 </p:presentation>
 </file>
 
@@ -254,7 +260,7 @@
           <a:p>
             <a:fld id="{B1AE0C7D-C6AA-F74A-B992-7EAC14746DB7}" type="datetimeFigureOut">
               <a:rPr lang="fr-FR" smtClean="0"/>
-              <a:t>10/03/2023</a:t>
+              <a:t>21/03/2023</a:t>
             </a:fld>
             <a:endParaRPr lang="fr-FR"/>
           </a:p>
@@ -452,7 +458,7 @@
           <a:p>
             <a:fld id="{B1AE0C7D-C6AA-F74A-B992-7EAC14746DB7}" type="datetimeFigureOut">
               <a:rPr lang="fr-FR" smtClean="0"/>
-              <a:t>10/03/2023</a:t>
+              <a:t>21/03/2023</a:t>
             </a:fld>
             <a:endParaRPr lang="fr-FR"/>
           </a:p>
@@ -660,7 +666,7 @@
           <a:p>
             <a:fld id="{B1AE0C7D-C6AA-F74A-B992-7EAC14746DB7}" type="datetimeFigureOut">
               <a:rPr lang="fr-FR" smtClean="0"/>
-              <a:t>10/03/2023</a:t>
+              <a:t>21/03/2023</a:t>
             </a:fld>
             <a:endParaRPr lang="fr-FR"/>
           </a:p>
@@ -858,7 +864,7 @@
           <a:p>
             <a:fld id="{B1AE0C7D-C6AA-F74A-B992-7EAC14746DB7}" type="datetimeFigureOut">
               <a:rPr lang="fr-FR" smtClean="0"/>
-              <a:t>10/03/2023</a:t>
+              <a:t>21/03/2023</a:t>
             </a:fld>
             <a:endParaRPr lang="fr-FR"/>
           </a:p>
@@ -1133,7 +1139,7 @@
           <a:p>
             <a:fld id="{B1AE0C7D-C6AA-F74A-B992-7EAC14746DB7}" type="datetimeFigureOut">
               <a:rPr lang="fr-FR" smtClean="0"/>
-              <a:t>10/03/2023</a:t>
+              <a:t>21/03/2023</a:t>
             </a:fld>
             <a:endParaRPr lang="fr-FR"/>
           </a:p>
@@ -1398,7 +1404,7 @@
           <a:p>
             <a:fld id="{B1AE0C7D-C6AA-F74A-B992-7EAC14746DB7}" type="datetimeFigureOut">
               <a:rPr lang="fr-FR" smtClean="0"/>
-              <a:t>10/03/2023</a:t>
+              <a:t>21/03/2023</a:t>
             </a:fld>
             <a:endParaRPr lang="fr-FR"/>
           </a:p>
@@ -1810,7 +1816,7 @@
           <a:p>
             <a:fld id="{B1AE0C7D-C6AA-F74A-B992-7EAC14746DB7}" type="datetimeFigureOut">
               <a:rPr lang="fr-FR" smtClean="0"/>
-              <a:t>10/03/2023</a:t>
+              <a:t>21/03/2023</a:t>
             </a:fld>
             <a:endParaRPr lang="fr-FR"/>
           </a:p>
@@ -1951,7 +1957,7 @@
           <a:p>
             <a:fld id="{B1AE0C7D-C6AA-F74A-B992-7EAC14746DB7}" type="datetimeFigureOut">
               <a:rPr lang="fr-FR" smtClean="0"/>
-              <a:t>10/03/2023</a:t>
+              <a:t>21/03/2023</a:t>
             </a:fld>
             <a:endParaRPr lang="fr-FR"/>
           </a:p>
@@ -2064,7 +2070,7 @@
           <a:p>
             <a:fld id="{B1AE0C7D-C6AA-F74A-B992-7EAC14746DB7}" type="datetimeFigureOut">
               <a:rPr lang="fr-FR" smtClean="0"/>
-              <a:t>10/03/2023</a:t>
+              <a:t>21/03/2023</a:t>
             </a:fld>
             <a:endParaRPr lang="fr-FR"/>
           </a:p>
@@ -2375,7 +2381,7 @@
           <a:p>
             <a:fld id="{B1AE0C7D-C6AA-F74A-B992-7EAC14746DB7}" type="datetimeFigureOut">
               <a:rPr lang="fr-FR" smtClean="0"/>
-              <a:t>10/03/2023</a:t>
+              <a:t>21/03/2023</a:t>
             </a:fld>
             <a:endParaRPr lang="fr-FR"/>
           </a:p>
@@ -2663,7 +2669,7 @@
           <a:p>
             <a:fld id="{B1AE0C7D-C6AA-F74A-B992-7EAC14746DB7}" type="datetimeFigureOut">
               <a:rPr lang="fr-FR" smtClean="0"/>
-              <a:t>10/03/2023</a:t>
+              <a:t>21/03/2023</a:t>
             </a:fld>
             <a:endParaRPr lang="fr-FR"/>
           </a:p>
@@ -2904,7 +2910,7 @@
           <a:p>
             <a:fld id="{B1AE0C7D-C6AA-F74A-B992-7EAC14746DB7}" type="datetimeFigureOut">
               <a:rPr lang="fr-FR" smtClean="0"/>
-              <a:t>10/03/2023</a:t>
+              <a:t>21/03/2023</a:t>
             </a:fld>
             <a:endParaRPr lang="fr-FR"/>
           </a:p>
@@ -3351,8 +3357,8 @@
           </a:prstGeom>
         </p:spPr>
       </p:pic>
-      <mc:AlternateContent xmlns:mc="http://schemas.openxmlformats.org/markup-compatibility/2006">
-        <mc:Choice xmlns:a14="http://schemas.microsoft.com/office/drawing/2010/main" Requires="a14">
+      <mc:AlternateContent xmlns:mc="http://schemas.openxmlformats.org/markup-compatibility/2006" xmlns:a14="http://schemas.microsoft.com/office/drawing/2010/main">
+        <mc:Choice Requires="a14">
           <p:sp>
             <p:nvSpPr>
               <p:cNvPr id="10" name="ZoneTexte 9">
@@ -3400,7 +3406,7 @@
             </p:txBody>
           </p:sp>
         </mc:Choice>
-        <mc:Fallback>
+        <mc:Fallback xmlns="">
           <p:sp>
             <p:nvSpPr>
               <p:cNvPr id="10" name="ZoneTexte 9">
@@ -3445,8 +3451,8 @@
           </p:sp>
         </mc:Fallback>
       </mc:AlternateContent>
-      <mc:AlternateContent xmlns:mc="http://schemas.openxmlformats.org/markup-compatibility/2006">
-        <mc:Choice xmlns:a14="http://schemas.microsoft.com/office/drawing/2010/main" Requires="a14">
+      <mc:AlternateContent xmlns:mc="http://schemas.openxmlformats.org/markup-compatibility/2006" xmlns:a14="http://schemas.microsoft.com/office/drawing/2010/main">
+        <mc:Choice Requires="a14">
           <p:sp>
             <p:nvSpPr>
               <p:cNvPr id="11" name="ZoneTexte 10">
@@ -3494,7 +3500,7 @@
             </p:txBody>
           </p:sp>
         </mc:Choice>
-        <mc:Fallback>
+        <mc:Fallback xmlns="">
           <p:sp>
             <p:nvSpPr>
               <p:cNvPr id="11" name="ZoneTexte 10">
@@ -3539,8 +3545,8 @@
           </p:sp>
         </mc:Fallback>
       </mc:AlternateContent>
-      <mc:AlternateContent xmlns:mc="http://schemas.openxmlformats.org/markup-compatibility/2006">
-        <mc:Choice xmlns:a14="http://schemas.microsoft.com/office/drawing/2010/main" Requires="a14">
+      <mc:AlternateContent xmlns:mc="http://schemas.openxmlformats.org/markup-compatibility/2006" xmlns:a14="http://schemas.microsoft.com/office/drawing/2010/main">
+        <mc:Choice Requires="a14">
           <p:sp>
             <p:nvSpPr>
               <p:cNvPr id="12" name="ZoneTexte 11">
@@ -3588,7 +3594,7 @@
             </p:txBody>
           </p:sp>
         </mc:Choice>
-        <mc:Fallback>
+        <mc:Fallback xmlns="">
           <p:sp>
             <p:nvSpPr>
               <p:cNvPr id="12" name="ZoneTexte 11">
@@ -3633,8 +3639,8 @@
           </p:sp>
         </mc:Fallback>
       </mc:AlternateContent>
-      <mc:AlternateContent xmlns:mc="http://schemas.openxmlformats.org/markup-compatibility/2006">
-        <mc:Choice xmlns:a14="http://schemas.microsoft.com/office/drawing/2010/main" Requires="a14">
+      <mc:AlternateContent xmlns:mc="http://schemas.openxmlformats.org/markup-compatibility/2006" xmlns:a14="http://schemas.microsoft.com/office/drawing/2010/main">
+        <mc:Choice Requires="a14">
           <p:sp>
             <p:nvSpPr>
               <p:cNvPr id="13" name="ZoneTexte 12">
@@ -3682,7 +3688,7 @@
             </p:txBody>
           </p:sp>
         </mc:Choice>
-        <mc:Fallback>
+        <mc:Fallback xmlns="">
           <p:sp>
             <p:nvSpPr>
               <p:cNvPr id="13" name="ZoneTexte 12">
@@ -4131,8 +4137,13 @@
             <a:pPr algn="ctr"/>
             <a:r>
               <a:rPr lang="fr-FR" dirty="0"/>
-              <a:t>Forgery detection</a:t>
-            </a:r>
+              <a:t>Forgery </a:t>
+            </a:r>
+            <a:r>
+              <a:rPr lang="fr-FR" dirty="0" err="1"/>
+              <a:t>detection</a:t>
+            </a:r>
+            <a:endParaRPr lang="fr-FR" dirty="0"/>
           </a:p>
         </p:txBody>
       </p:sp>
@@ -4208,8 +4219,8 @@
           </a:p>
         </p:txBody>
       </p:sp>
-      <mc:AlternateContent xmlns:mc="http://schemas.openxmlformats.org/markup-compatibility/2006">
-        <mc:Choice xmlns:a14="http://schemas.microsoft.com/office/drawing/2010/main" Requires="a14">
+      <mc:AlternateContent xmlns:mc="http://schemas.openxmlformats.org/markup-compatibility/2006" xmlns:a14="http://schemas.microsoft.com/office/drawing/2010/main">
+        <mc:Choice Requires="a14">
           <p:sp>
             <p:nvSpPr>
               <p:cNvPr id="46" name="ZoneTexte 45">
@@ -4268,7 +4279,7 @@
             </p:txBody>
           </p:sp>
         </mc:Choice>
-        <mc:Fallback>
+        <mc:Fallback xmlns="">
           <p:sp>
             <p:nvSpPr>
               <p:cNvPr id="46" name="ZoneTexte 45">
@@ -4377,6 +4388,233 @@
     <p:extLst>
       <p:ext uri="{BB962C8B-B14F-4D97-AF65-F5344CB8AC3E}">
         <p14:creationId xmlns:p14="http://schemas.microsoft.com/office/powerpoint/2010/main" val="3759667317"/>
+      </p:ext>
+    </p:extLst>
+  </p:cSld>
+  <p:clrMapOvr>
+    <a:masterClrMapping/>
+  </p:clrMapOvr>
+</p:sld>
+</file>
+
+<file path=ppt/slides/slide2.xml><?xml version="1.0" encoding="utf-8"?>
+<p:sld xmlns:a="http://schemas.openxmlformats.org/drawingml/2006/main" xmlns:r="http://schemas.openxmlformats.org/officeDocument/2006/relationships" xmlns:p="http://schemas.openxmlformats.org/presentationml/2006/main">
+  <p:cSld>
+    <p:spTree>
+      <p:nvGrpSpPr>
+        <p:cNvPr id="1" name=""/>
+        <p:cNvGrpSpPr/>
+        <p:nvPr/>
+      </p:nvGrpSpPr>
+      <p:grpSpPr>
+        <a:xfrm>
+          <a:off x="0" y="0"/>
+          <a:ext cx="0" cy="0"/>
+          <a:chOff x="0" y="0"/>
+          <a:chExt cx="0" cy="0"/>
+        </a:xfrm>
+      </p:grpSpPr>
+      <p:pic>
+        <p:nvPicPr>
+          <p:cNvPr id="5" name="Espace réservé du contenu 4" descr="Une image contenant texte&#10;&#10;Description générée automatiquement">
+            <a:extLst>
+              <a:ext uri="{FF2B5EF4-FFF2-40B4-BE49-F238E27FC236}">
+                <a16:creationId xmlns:a16="http://schemas.microsoft.com/office/drawing/2014/main" id="{1FE6500A-1A20-CD8B-98BF-0775643A87E5}"/>
+              </a:ext>
+            </a:extLst>
+          </p:cNvPr>
+          <p:cNvPicPr>
+            <a:picLocks noGrp="1" noChangeAspect="1"/>
+          </p:cNvPicPr>
+          <p:nvPr>
+            <p:ph idx="1"/>
+          </p:nvPr>
+        </p:nvPicPr>
+        <p:blipFill>
+          <a:blip r:embed="rId2"/>
+          <a:stretch>
+            <a:fillRect/>
+          </a:stretch>
+        </p:blipFill>
+        <p:spPr>
+          <a:xfrm>
+            <a:off x="2196686" y="2618908"/>
+            <a:ext cx="3032778" cy="1692174"/>
+          </a:xfrm>
+        </p:spPr>
+      </p:pic>
+      <p:pic>
+        <p:nvPicPr>
+          <p:cNvPr id="7" name="Image 6" descr="Une image contenant texte, signe, bleu&#10;&#10;Description générée automatiquement">
+            <a:extLst>
+              <a:ext uri="{FF2B5EF4-FFF2-40B4-BE49-F238E27FC236}">
+                <a16:creationId xmlns:a16="http://schemas.microsoft.com/office/drawing/2014/main" id="{2A15FBAC-08B4-4DA3-6213-BC2B088BC137}"/>
+              </a:ext>
+            </a:extLst>
+          </p:cNvPr>
+          <p:cNvPicPr>
+            <a:picLocks noChangeAspect="1"/>
+          </p:cNvPicPr>
+          <p:nvPr/>
+        </p:nvPicPr>
+        <p:blipFill>
+          <a:blip r:embed="rId3"/>
+          <a:stretch>
+            <a:fillRect/>
+          </a:stretch>
+        </p:blipFill>
+        <p:spPr>
+          <a:xfrm>
+            <a:off x="2211576" y="541413"/>
+            <a:ext cx="3022576" cy="1686482"/>
+          </a:xfrm>
+          <a:prstGeom prst="rect">
+            <a:avLst/>
+          </a:prstGeom>
+        </p:spPr>
+      </p:pic>
+      <p:sp>
+        <p:nvSpPr>
+          <p:cNvPr id="8" name="ZoneTexte 7">
+            <a:extLst>
+              <a:ext uri="{FF2B5EF4-FFF2-40B4-BE49-F238E27FC236}">
+                <a16:creationId xmlns:a16="http://schemas.microsoft.com/office/drawing/2014/main" id="{6CDA5D84-BE73-1153-7C9A-8F2EA0F335D8}"/>
+              </a:ext>
+            </a:extLst>
+          </p:cNvPr>
+          <p:cNvSpPr txBox="1"/>
+          <p:nvPr/>
+        </p:nvSpPr>
+        <p:spPr>
+          <a:xfrm>
+            <a:off x="2384997" y="2227895"/>
+            <a:ext cx="2675734" cy="369332"/>
+          </a:xfrm>
+          <a:prstGeom prst="rect">
+            <a:avLst/>
+          </a:prstGeom>
+          <a:noFill/>
+        </p:spPr>
+        <p:txBody>
+          <a:bodyPr wrap="square" rtlCol="0">
+            <a:spAutoFit/>
+          </a:bodyPr>
+          <a:lstStyle/>
+          <a:p>
+            <a:pPr algn="ctr"/>
+            <a:r>
+              <a:rPr lang="fr-FR" dirty="0"/>
+              <a:t>Original Image</a:t>
+            </a:r>
+          </a:p>
+        </p:txBody>
+      </p:sp>
+      <p:pic>
+        <p:nvPicPr>
+          <p:cNvPr id="10" name="Image 9" descr="Une image contenant texte&#10;&#10;Description générée automatiquement">
+            <a:extLst>
+              <a:ext uri="{FF2B5EF4-FFF2-40B4-BE49-F238E27FC236}">
+                <a16:creationId xmlns:a16="http://schemas.microsoft.com/office/drawing/2014/main" id="{CF576374-CC86-5E4C-4AE8-403BFC451BA6}"/>
+              </a:ext>
+            </a:extLst>
+          </p:cNvPr>
+          <p:cNvPicPr>
+            <a:picLocks noChangeAspect="1"/>
+          </p:cNvPicPr>
+          <p:nvPr/>
+        </p:nvPicPr>
+        <p:blipFill>
+          <a:blip r:embed="rId4"/>
+          <a:stretch>
+            <a:fillRect/>
+          </a:stretch>
+        </p:blipFill>
+        <p:spPr>
+          <a:xfrm>
+            <a:off x="2211576" y="4702095"/>
+            <a:ext cx="3023437" cy="1611864"/>
+          </a:xfrm>
+          <a:prstGeom prst="rect">
+            <a:avLst/>
+          </a:prstGeom>
+        </p:spPr>
+      </p:pic>
+      <p:sp>
+        <p:nvSpPr>
+          <p:cNvPr id="11" name="ZoneTexte 10">
+            <a:extLst>
+              <a:ext uri="{FF2B5EF4-FFF2-40B4-BE49-F238E27FC236}">
+                <a16:creationId xmlns:a16="http://schemas.microsoft.com/office/drawing/2014/main" id="{5044742E-CEEB-7997-DD4E-0216055BF52B}"/>
+              </a:ext>
+            </a:extLst>
+          </p:cNvPr>
+          <p:cNvSpPr txBox="1"/>
+          <p:nvPr/>
+        </p:nvSpPr>
+        <p:spPr>
+          <a:xfrm>
+            <a:off x="2375208" y="4311082"/>
+            <a:ext cx="2675734" cy="369332"/>
+          </a:xfrm>
+          <a:prstGeom prst="rect">
+            <a:avLst/>
+          </a:prstGeom>
+          <a:noFill/>
+        </p:spPr>
+        <p:txBody>
+          <a:bodyPr wrap="square" rtlCol="0">
+            <a:spAutoFit/>
+          </a:bodyPr>
+          <a:lstStyle/>
+          <a:p>
+            <a:pPr algn="ctr"/>
+            <a:r>
+              <a:rPr lang="fr-FR" dirty="0"/>
+              <a:t>Fake image</a:t>
+            </a:r>
+          </a:p>
+        </p:txBody>
+      </p:sp>
+      <p:sp>
+        <p:nvSpPr>
+          <p:cNvPr id="12" name="ZoneTexte 11">
+            <a:extLst>
+              <a:ext uri="{FF2B5EF4-FFF2-40B4-BE49-F238E27FC236}">
+                <a16:creationId xmlns:a16="http://schemas.microsoft.com/office/drawing/2014/main" id="{2F08C0BC-077B-D893-068A-96B509142DB1}"/>
+              </a:ext>
+            </a:extLst>
+          </p:cNvPr>
+          <p:cNvSpPr txBox="1"/>
+          <p:nvPr/>
+        </p:nvSpPr>
+        <p:spPr>
+          <a:xfrm>
+            <a:off x="2375208" y="6313959"/>
+            <a:ext cx="2675734" cy="369332"/>
+          </a:xfrm>
+          <a:prstGeom prst="rect">
+            <a:avLst/>
+          </a:prstGeom>
+          <a:noFill/>
+        </p:spPr>
+        <p:txBody>
+          <a:bodyPr wrap="square" rtlCol="0">
+            <a:spAutoFit/>
+          </a:bodyPr>
+          <a:lstStyle/>
+          <a:p>
+            <a:pPr algn="ctr"/>
+            <a:r>
+              <a:rPr lang="fr-FR" dirty="0"/>
+              <a:t>Detection</a:t>
+            </a:r>
+          </a:p>
+        </p:txBody>
+      </p:sp>
+    </p:spTree>
+    <p:extLst>
+      <p:ext uri="{BB962C8B-B14F-4D97-AF65-F5344CB8AC3E}">
+        <p14:creationId xmlns:p14="http://schemas.microsoft.com/office/powerpoint/2010/main" val="2684989020"/>
       </p:ext>
     </p:extLst>
   </p:cSld>

</xml_diff>